<commit_message>
minor change to ppt 2
</commit_message>
<xml_diff>
--- a/docs/Presentations/Presentation 2.pptx
+++ b/docs/Presentations/Presentation 2.pptx
@@ -7508,7 +7508,7 @@
             <a:tbl>
               <a:tblPr>
                 <a:noFill/>
-                <a:tableStyleId>{45DAF684-DABB-4391-8C75-9F42DBE5FC97}</a:tableStyleId>
+                <a:tableStyleId>{A76B56BF-0389-4B2B-917E-F9EB1818B100}</a:tableStyleId>
               </a:tblPr>
               <a:tblGrid>
                 <a:gridCol w="1981200"/>
@@ -8033,7 +8033,7 @@
         <p:spPr>
           <a:xfrm>
             <a:off x="311700" y="445025"/>
-            <a:ext cx="8520600" cy="572700"/>
+            <a:ext cx="8520600" cy="1209900"/>
           </a:xfrm>
           <a:prstGeom prst="rect">
             <a:avLst/>
@@ -8059,6 +8059,26 @@
               <a:t>ER Model</a:t>
             </a:r>
             <a:endParaRPr/>
+          </a:p>
+          <a:p>
+            <a:pPr indent="0" lvl="0" marL="0" rtl="0" algn="l">
+              <a:spcBef>
+                <a:spcPts val="0"/>
+              </a:spcBef>
+              <a:spcAft>
+                <a:spcPts val="0"/>
+              </a:spcAft>
+              <a:buNone/>
+            </a:pPr>
+            <a:r>
+              <a:rPr lang="en"/>
+              <a:t>	</a:t>
+            </a:r>
+            <a:r>
+              <a:rPr lang="en" sz="1200"/>
+              <a:t>Needs updating due to formatting and program issues</a:t>
+            </a:r>
+            <a:endParaRPr sz="1200"/>
           </a:p>
         </p:txBody>
       </p:sp>
@@ -8078,8 +8098,8 @@
         </p:blipFill>
         <p:spPr>
           <a:xfrm>
-            <a:off x="716825" y="1152475"/>
-            <a:ext cx="7613713" cy="3528550"/>
+            <a:off x="716825" y="1905000"/>
+            <a:ext cx="7177025" cy="2776025"/>
           </a:xfrm>
           <a:prstGeom prst="rect">
             <a:avLst/>

</xml_diff>